<commit_message>
Add printout of trajectories
</commit_message>
<xml_diff>
--- a/Projekt/Presentation.pptx
+++ b/Projekt/Presentation.pptx
@@ -7,6 +7,8 @@
   <p:sldIdLst>
     <p:sldId id="256" r:id="rId2"/>
     <p:sldId id="257" r:id="rId3"/>
+    <p:sldId id="258" r:id="rId4"/>
+    <p:sldId id="259" r:id="rId5"/>
   </p:sldIdLst>
   <p:sldSz cx="12192000" cy="6858000"/>
   <p:notesSz cx="6858000" cy="9144000"/>
@@ -105,6 +107,11 @@
       </a:defRPr>
     </a:lvl9pPr>
   </p:defaultTextStyle>
+  <p:extLst>
+    <p:ext uri="{EFAFB233-063F-42B5-8137-9DF3F51BA10A}">
+      <p15:sldGuideLst xmlns:p15="http://schemas.microsoft.com/office/powerpoint/2012/main"/>
+    </p:ext>
+  </p:extLst>
 </p:presentation>
 </file>
 
@@ -153,7 +160,6 @@
               <a:rPr lang="sv-SE"/>
               <a:t>Klicka här för att ändra format</a:t>
             </a:r>
-            <a:endParaRPr lang="sv-SE"/>
           </a:p>
         </p:txBody>
       </p:sp>
@@ -218,7 +224,6 @@
               <a:rPr lang="sv-SE"/>
               <a:t>Klicka om du vill redigera mall för underrubrikformat</a:t>
             </a:r>
-            <a:endParaRPr lang="sv-SE"/>
           </a:p>
         </p:txBody>
       </p:sp>
@@ -239,7 +244,7 @@
           <a:p>
             <a:fld id="{41F373E1-5C2F-4835-94F7-580B3723F6FF}" type="datetimeFigureOut">
               <a:rPr lang="sv-SE" smtClean="0"/>
-              <a:t>2016-11-11</a:t>
+              <a:t>2016-11-16</a:t>
             </a:fld>
             <a:endParaRPr lang="sv-SE"/>
           </a:p>
@@ -336,7 +341,6 @@
               <a:rPr lang="sv-SE"/>
               <a:t>Klicka här för att ändra format</a:t>
             </a:r>
-            <a:endParaRPr lang="sv-SE"/>
           </a:p>
         </p:txBody>
       </p:sp>
@@ -388,7 +392,6 @@
               <a:rPr lang="sv-SE"/>
               <a:t>Nivå fem</a:t>
             </a:r>
-            <a:endParaRPr lang="sv-SE"/>
           </a:p>
         </p:txBody>
       </p:sp>
@@ -409,7 +412,7 @@
           <a:p>
             <a:fld id="{41F373E1-5C2F-4835-94F7-580B3723F6FF}" type="datetimeFigureOut">
               <a:rPr lang="sv-SE" smtClean="0"/>
-              <a:t>2016-11-11</a:t>
+              <a:t>2016-11-16</a:t>
             </a:fld>
             <a:endParaRPr lang="sv-SE"/>
           </a:p>
@@ -511,7 +514,6 @@
               <a:rPr lang="sv-SE"/>
               <a:t>Klicka här för att ändra format</a:t>
             </a:r>
-            <a:endParaRPr lang="sv-SE"/>
           </a:p>
         </p:txBody>
       </p:sp>
@@ -568,7 +570,6 @@
               <a:rPr lang="sv-SE"/>
               <a:t>Nivå fem</a:t>
             </a:r>
-            <a:endParaRPr lang="sv-SE"/>
           </a:p>
         </p:txBody>
       </p:sp>
@@ -589,7 +590,7 @@
           <a:p>
             <a:fld id="{41F373E1-5C2F-4835-94F7-580B3723F6FF}" type="datetimeFigureOut">
               <a:rPr lang="sv-SE" smtClean="0"/>
-              <a:t>2016-11-11</a:t>
+              <a:t>2016-11-16</a:t>
             </a:fld>
             <a:endParaRPr lang="sv-SE"/>
           </a:p>
@@ -686,7 +687,6 @@
               <a:rPr lang="sv-SE"/>
               <a:t>Klicka här för att ändra format</a:t>
             </a:r>
-            <a:endParaRPr lang="sv-SE"/>
           </a:p>
         </p:txBody>
       </p:sp>
@@ -738,7 +738,6 @@
               <a:rPr lang="sv-SE"/>
               <a:t>Nivå fem</a:t>
             </a:r>
-            <a:endParaRPr lang="sv-SE"/>
           </a:p>
         </p:txBody>
       </p:sp>
@@ -759,7 +758,7 @@
           <a:p>
             <a:fld id="{41F373E1-5C2F-4835-94F7-580B3723F6FF}" type="datetimeFigureOut">
               <a:rPr lang="sv-SE" smtClean="0"/>
-              <a:t>2016-11-11</a:t>
+              <a:t>2016-11-16</a:t>
             </a:fld>
             <a:endParaRPr lang="sv-SE"/>
           </a:p>
@@ -865,7 +864,6 @@
               <a:rPr lang="sv-SE"/>
               <a:t>Klicka här för att ändra format</a:t>
             </a:r>
-            <a:endParaRPr lang="sv-SE"/>
           </a:p>
         </p:txBody>
       </p:sp>
@@ -1005,7 +1003,7 @@
           <a:p>
             <a:fld id="{41F373E1-5C2F-4835-94F7-580B3723F6FF}" type="datetimeFigureOut">
               <a:rPr lang="sv-SE" smtClean="0"/>
-              <a:t>2016-11-11</a:t>
+              <a:t>2016-11-16</a:t>
             </a:fld>
             <a:endParaRPr lang="sv-SE"/>
           </a:p>
@@ -1102,7 +1100,6 @@
               <a:rPr lang="sv-SE"/>
               <a:t>Klicka här för att ändra format</a:t>
             </a:r>
-            <a:endParaRPr lang="sv-SE"/>
           </a:p>
         </p:txBody>
       </p:sp>
@@ -1159,7 +1156,6 @@
               <a:rPr lang="sv-SE"/>
               <a:t>Nivå fem</a:t>
             </a:r>
-            <a:endParaRPr lang="sv-SE"/>
           </a:p>
         </p:txBody>
       </p:sp>
@@ -1216,7 +1212,6 @@
               <a:rPr lang="sv-SE"/>
               <a:t>Nivå fem</a:t>
             </a:r>
-            <a:endParaRPr lang="sv-SE"/>
           </a:p>
         </p:txBody>
       </p:sp>
@@ -1237,7 +1232,7 @@
           <a:p>
             <a:fld id="{41F373E1-5C2F-4835-94F7-580B3723F6FF}" type="datetimeFigureOut">
               <a:rPr lang="sv-SE" smtClean="0"/>
-              <a:t>2016-11-11</a:t>
+              <a:t>2016-11-16</a:t>
             </a:fld>
             <a:endParaRPr lang="sv-SE"/>
           </a:p>
@@ -1339,7 +1334,6 @@
               <a:rPr lang="sv-SE"/>
               <a:t>Klicka här för att ändra format</a:t>
             </a:r>
-            <a:endParaRPr lang="sv-SE"/>
           </a:p>
         </p:txBody>
       </p:sp>
@@ -1461,7 +1455,6 @@
               <a:rPr lang="sv-SE"/>
               <a:t>Nivå fem</a:t>
             </a:r>
-            <a:endParaRPr lang="sv-SE"/>
           </a:p>
         </p:txBody>
       </p:sp>
@@ -1583,7 +1576,6 @@
               <a:rPr lang="sv-SE"/>
               <a:t>Nivå fem</a:t>
             </a:r>
-            <a:endParaRPr lang="sv-SE"/>
           </a:p>
         </p:txBody>
       </p:sp>
@@ -1604,7 +1596,7 @@
           <a:p>
             <a:fld id="{41F373E1-5C2F-4835-94F7-580B3723F6FF}" type="datetimeFigureOut">
               <a:rPr lang="sv-SE" smtClean="0"/>
-              <a:t>2016-11-11</a:t>
+              <a:t>2016-11-16</a:t>
             </a:fld>
             <a:endParaRPr lang="sv-SE"/>
           </a:p>
@@ -1701,7 +1693,6 @@
               <a:rPr lang="sv-SE"/>
               <a:t>Klicka här för att ändra format</a:t>
             </a:r>
-            <a:endParaRPr lang="sv-SE"/>
           </a:p>
         </p:txBody>
       </p:sp>
@@ -1722,7 +1713,7 @@
           <a:p>
             <a:fld id="{41F373E1-5C2F-4835-94F7-580B3723F6FF}" type="datetimeFigureOut">
               <a:rPr lang="sv-SE" smtClean="0"/>
-              <a:t>2016-11-11</a:t>
+              <a:t>2016-11-16</a:t>
             </a:fld>
             <a:endParaRPr lang="sv-SE"/>
           </a:p>
@@ -1817,7 +1808,7 @@
           <a:p>
             <a:fld id="{41F373E1-5C2F-4835-94F7-580B3723F6FF}" type="datetimeFigureOut">
               <a:rPr lang="sv-SE" smtClean="0"/>
-              <a:t>2016-11-11</a:t>
+              <a:t>2016-11-16</a:t>
             </a:fld>
             <a:endParaRPr lang="sv-SE"/>
           </a:p>
@@ -1923,7 +1914,6 @@
               <a:rPr lang="sv-SE"/>
               <a:t>Klicka här för att ändra format</a:t>
             </a:r>
-            <a:endParaRPr lang="sv-SE"/>
           </a:p>
         </p:txBody>
       </p:sp>
@@ -2008,7 +1998,6 @@
               <a:rPr lang="sv-SE"/>
               <a:t>Nivå fem</a:t>
             </a:r>
-            <a:endParaRPr lang="sv-SE"/>
           </a:p>
         </p:txBody>
       </p:sp>
@@ -2094,7 +2083,7 @@
           <a:p>
             <a:fld id="{41F373E1-5C2F-4835-94F7-580B3723F6FF}" type="datetimeFigureOut">
               <a:rPr lang="sv-SE" smtClean="0"/>
-              <a:t>2016-11-11</a:t>
+              <a:t>2016-11-16</a:t>
             </a:fld>
             <a:endParaRPr lang="sv-SE"/>
           </a:p>
@@ -2200,7 +2189,6 @@
               <a:rPr lang="sv-SE"/>
               <a:t>Klicka här för att ändra format</a:t>
             </a:r>
-            <a:endParaRPr lang="sv-SE"/>
           </a:p>
         </p:txBody>
       </p:sp>
@@ -2347,7 +2335,7 @@
           <a:p>
             <a:fld id="{41F373E1-5C2F-4835-94F7-580B3723F6FF}" type="datetimeFigureOut">
               <a:rPr lang="sv-SE" smtClean="0"/>
-              <a:t>2016-11-11</a:t>
+              <a:t>2016-11-16</a:t>
             </a:fld>
             <a:endParaRPr lang="sv-SE"/>
           </a:p>
@@ -2459,7 +2447,6 @@
               <a:rPr lang="sv-SE"/>
               <a:t>Klicka här för att ändra format</a:t>
             </a:r>
-            <a:endParaRPr lang="sv-SE"/>
           </a:p>
         </p:txBody>
       </p:sp>
@@ -2521,7 +2508,6 @@
               <a:rPr lang="sv-SE"/>
               <a:t>Nivå fem</a:t>
             </a:r>
-            <a:endParaRPr lang="sv-SE"/>
           </a:p>
         </p:txBody>
       </p:sp>
@@ -2560,7 +2546,7 @@
           <a:p>
             <a:fld id="{41F373E1-5C2F-4835-94F7-580B3723F6FF}" type="datetimeFigureOut">
               <a:rPr lang="sv-SE" smtClean="0"/>
-              <a:t>2016-11-11</a:t>
+              <a:t>2016-11-16</a:t>
             </a:fld>
             <a:endParaRPr lang="sv-SE"/>
           </a:p>
@@ -3129,7 +3115,7 @@
         </p:blipFill>
         <p:spPr bwMode="auto">
           <a:xfrm>
-            <a:off x="4407678" y="2542591"/>
+            <a:off x="4231509" y="2509935"/>
             <a:ext cx="3864947" cy="3046267"/>
           </a:xfrm>
           <a:prstGeom prst="rect">
@@ -3220,6 +3206,447 @@
     <p:extLst>
       <p:ext uri="{BB962C8B-B14F-4D97-AF65-F5344CB8AC3E}">
         <p14:creationId xmlns:p14="http://schemas.microsoft.com/office/powerpoint/2010/main" val="3533832464"/>
+      </p:ext>
+    </p:extLst>
+  </p:cSld>
+  <p:clrMapOvr>
+    <a:masterClrMapping/>
+  </p:clrMapOvr>
+</p:sld>
+</file>
+
+<file path=ppt/slides/slide3.xml><?xml version="1.0" encoding="utf-8"?>
+<p:sld xmlns:a="http://schemas.openxmlformats.org/drawingml/2006/main" xmlns:r="http://schemas.openxmlformats.org/officeDocument/2006/relationships" xmlns:p="http://schemas.openxmlformats.org/presentationml/2006/main">
+  <p:cSld>
+    <p:spTree>
+      <p:nvGrpSpPr>
+        <p:cNvPr id="1" name=""/>
+        <p:cNvGrpSpPr/>
+        <p:nvPr/>
+      </p:nvGrpSpPr>
+      <p:grpSpPr>
+        <a:xfrm>
+          <a:off x="0" y="0"/>
+          <a:ext cx="0" cy="0"/>
+          <a:chOff x="0" y="0"/>
+          <a:chExt cx="0" cy="0"/>
+        </a:xfrm>
+      </p:grpSpPr>
+      <p:sp>
+        <p:nvSpPr>
+          <p:cNvPr id="2" name="Rubrik 1"/>
+          <p:cNvSpPr>
+            <a:spLocks noGrp="1"/>
+          </p:cNvSpPr>
+          <p:nvPr>
+            <p:ph type="title"/>
+          </p:nvPr>
+        </p:nvSpPr>
+        <p:spPr/>
+        <p:txBody>
+          <a:bodyPr/>
+          <a:lstStyle/>
+          <a:p>
+            <a:endParaRPr lang="sv-SE"/>
+          </a:p>
+        </p:txBody>
+      </p:sp>
+      <p:pic>
+        <p:nvPicPr>
+          <p:cNvPr id="4" name="Bildobjekt 1"/>
+          <p:cNvPicPr>
+            <a:picLocks/>
+          </p:cNvPicPr>
+          <p:nvPr/>
+        </p:nvPicPr>
+        <p:blipFill>
+          <a:blip r:embed="rId2">
+            <a:extLst>
+              <a:ext uri="{28A0092B-C50C-407E-A947-70E740481C1C}">
+                <a14:useLocalDpi xmlns:a14="http://schemas.microsoft.com/office/drawing/2010/main" val="0"/>
+              </a:ext>
+            </a:extLst>
+          </a:blip>
+          <a:srcRect/>
+          <a:stretch>
+            <a:fillRect/>
+          </a:stretch>
+        </p:blipFill>
+        <p:spPr bwMode="auto">
+          <a:xfrm>
+            <a:off x="2307866" y="1613038"/>
+            <a:ext cx="3596841" cy="2621561"/>
+          </a:xfrm>
+          <a:prstGeom prst="rect">
+            <a:avLst/>
+          </a:prstGeom>
+          <a:noFill/>
+          <a:ln w="9525">
+            <a:solidFill>
+              <a:srgbClr val="000000"/>
+            </a:solidFill>
+            <a:miter lim="800000"/>
+            <a:headEnd/>
+            <a:tailEnd/>
+          </a:ln>
+          <a:extLst>
+            <a:ext uri="{909E8E84-426E-40DD-AFC4-6F175D3DCCD1}">
+              <a14:hiddenFill xmlns:a14="http://schemas.microsoft.com/office/drawing/2010/main">
+                <a:solidFill>
+                  <a:srgbClr val="FFFFFF"/>
+                </a:solidFill>
+              </a14:hiddenFill>
+            </a:ext>
+          </a:extLst>
+        </p:spPr>
+      </p:pic>
+      <p:pic>
+        <p:nvPicPr>
+          <p:cNvPr id="5" name="Bildobjekt 1"/>
+          <p:cNvPicPr>
+            <a:picLocks/>
+          </p:cNvPicPr>
+          <p:nvPr/>
+        </p:nvPicPr>
+        <p:blipFill>
+          <a:blip r:embed="rId3">
+            <a:extLst>
+              <a:ext uri="{28A0092B-C50C-407E-A947-70E740481C1C}">
+                <a14:useLocalDpi xmlns:a14="http://schemas.microsoft.com/office/drawing/2010/main" val="0"/>
+              </a:ext>
+            </a:extLst>
+          </a:blip>
+          <a:srcRect/>
+          <a:stretch>
+            <a:fillRect/>
+          </a:stretch>
+        </p:blipFill>
+        <p:spPr bwMode="auto">
+          <a:xfrm>
+            <a:off x="5904708" y="1613959"/>
+            <a:ext cx="3596841" cy="2621560"/>
+          </a:xfrm>
+          <a:prstGeom prst="rect">
+            <a:avLst/>
+          </a:prstGeom>
+          <a:noFill/>
+          <a:ln w="9525">
+            <a:solidFill>
+              <a:srgbClr val="000000"/>
+            </a:solidFill>
+            <a:miter lim="800000"/>
+            <a:headEnd/>
+            <a:tailEnd/>
+          </a:ln>
+          <a:extLst>
+            <a:ext uri="{909E8E84-426E-40DD-AFC4-6F175D3DCCD1}">
+              <a14:hiddenFill xmlns:a14="http://schemas.microsoft.com/office/drawing/2010/main">
+                <a:solidFill>
+                  <a:srgbClr val="FFFFFF"/>
+                </a:solidFill>
+              </a14:hiddenFill>
+            </a:ext>
+          </a:extLst>
+        </p:spPr>
+      </p:pic>
+      <p:pic>
+        <p:nvPicPr>
+          <p:cNvPr id="6" name="Bildobjekt 1"/>
+          <p:cNvPicPr>
+            <a:picLocks/>
+          </p:cNvPicPr>
+          <p:nvPr/>
+        </p:nvPicPr>
+        <p:blipFill>
+          <a:blip r:embed="rId4">
+            <a:extLst>
+              <a:ext uri="{28A0092B-C50C-407E-A947-70E740481C1C}">
+                <a14:useLocalDpi xmlns:a14="http://schemas.microsoft.com/office/drawing/2010/main" val="0"/>
+              </a:ext>
+            </a:extLst>
+          </a:blip>
+          <a:srcRect/>
+          <a:stretch>
+            <a:fillRect/>
+          </a:stretch>
+        </p:blipFill>
+        <p:spPr bwMode="auto">
+          <a:xfrm>
+            <a:off x="5904708" y="4236440"/>
+            <a:ext cx="3596841" cy="2621560"/>
+          </a:xfrm>
+          <a:prstGeom prst="rect">
+            <a:avLst/>
+          </a:prstGeom>
+          <a:noFill/>
+          <a:ln w="9525">
+            <a:solidFill>
+              <a:srgbClr val="000000"/>
+            </a:solidFill>
+            <a:miter lim="800000"/>
+            <a:headEnd/>
+            <a:tailEnd/>
+          </a:ln>
+          <a:extLst>
+            <a:ext uri="{909E8E84-426E-40DD-AFC4-6F175D3DCCD1}">
+              <a14:hiddenFill xmlns:a14="http://schemas.microsoft.com/office/drawing/2010/main">
+                <a:solidFill>
+                  <a:srgbClr val="FFFFFF"/>
+                </a:solidFill>
+              </a14:hiddenFill>
+            </a:ext>
+          </a:extLst>
+        </p:spPr>
+      </p:pic>
+      <p:pic>
+        <p:nvPicPr>
+          <p:cNvPr id="7" name="Bildobjekt 1"/>
+          <p:cNvPicPr>
+            <a:picLocks/>
+          </p:cNvPicPr>
+          <p:nvPr/>
+        </p:nvPicPr>
+        <p:blipFill>
+          <a:blip r:embed="rId5">
+            <a:extLst>
+              <a:ext uri="{28A0092B-C50C-407E-A947-70E740481C1C}">
+                <a14:useLocalDpi xmlns:a14="http://schemas.microsoft.com/office/drawing/2010/main" val="0"/>
+              </a:ext>
+            </a:extLst>
+          </a:blip>
+          <a:srcRect/>
+          <a:stretch>
+            <a:fillRect/>
+          </a:stretch>
+        </p:blipFill>
+        <p:spPr bwMode="auto">
+          <a:xfrm>
+            <a:off x="2307867" y="4234599"/>
+            <a:ext cx="3596841" cy="2623401"/>
+          </a:xfrm>
+          <a:prstGeom prst="rect">
+            <a:avLst/>
+          </a:prstGeom>
+          <a:noFill/>
+          <a:ln w="9525">
+            <a:solidFill>
+              <a:srgbClr val="000000"/>
+            </a:solidFill>
+            <a:miter lim="800000"/>
+            <a:headEnd/>
+            <a:tailEnd/>
+          </a:ln>
+          <a:extLst>
+            <a:ext uri="{909E8E84-426E-40DD-AFC4-6F175D3DCCD1}">
+              <a14:hiddenFill xmlns:a14="http://schemas.microsoft.com/office/drawing/2010/main">
+                <a:solidFill>
+                  <a:srgbClr val="FFFFFF"/>
+                </a:solidFill>
+              </a14:hiddenFill>
+            </a:ext>
+          </a:extLst>
+        </p:spPr>
+      </p:pic>
+    </p:spTree>
+    <p:extLst>
+      <p:ext uri="{BB962C8B-B14F-4D97-AF65-F5344CB8AC3E}">
+        <p14:creationId xmlns:p14="http://schemas.microsoft.com/office/powerpoint/2010/main" val="1901307067"/>
+      </p:ext>
+    </p:extLst>
+  </p:cSld>
+  <p:clrMapOvr>
+    <a:masterClrMapping/>
+  </p:clrMapOvr>
+</p:sld>
+</file>
+
+<file path=ppt/slides/slide4.xml><?xml version="1.0" encoding="utf-8"?>
+<p:sld xmlns:a="http://schemas.openxmlformats.org/drawingml/2006/main" xmlns:r="http://schemas.openxmlformats.org/officeDocument/2006/relationships" xmlns:p="http://schemas.openxmlformats.org/presentationml/2006/main">
+  <p:cSld>
+    <p:spTree>
+      <p:nvGrpSpPr>
+        <p:cNvPr id="1" name=""/>
+        <p:cNvGrpSpPr/>
+        <p:nvPr/>
+      </p:nvGrpSpPr>
+      <p:grpSpPr>
+        <a:xfrm>
+          <a:off x="0" y="0"/>
+          <a:ext cx="0" cy="0"/>
+          <a:chOff x="0" y="0"/>
+          <a:chExt cx="0" cy="0"/>
+        </a:xfrm>
+      </p:grpSpPr>
+      <p:sp>
+        <p:nvSpPr>
+          <p:cNvPr id="2" name="Rubrik 1"/>
+          <p:cNvSpPr>
+            <a:spLocks noGrp="1"/>
+          </p:cNvSpPr>
+          <p:nvPr>
+            <p:ph type="title"/>
+          </p:nvPr>
+        </p:nvSpPr>
+        <p:spPr/>
+        <p:txBody>
+          <a:bodyPr/>
+          <a:lstStyle/>
+          <a:p>
+            <a:endParaRPr lang="sv-SE"/>
+          </a:p>
+        </p:txBody>
+      </p:sp>
+      <p:pic>
+        <p:nvPicPr>
+          <p:cNvPr id="4" name="Bildobjekt 1"/>
+          <p:cNvPicPr>
+            <a:picLocks/>
+          </p:cNvPicPr>
+          <p:nvPr/>
+        </p:nvPicPr>
+        <p:blipFill>
+          <a:blip r:embed="rId2">
+            <a:extLst>
+              <a:ext uri="{28A0092B-C50C-407E-A947-70E740481C1C}">
+                <a14:useLocalDpi xmlns:a14="http://schemas.microsoft.com/office/drawing/2010/main" val="0"/>
+              </a:ext>
+            </a:extLst>
+          </a:blip>
+          <a:srcRect/>
+          <a:stretch>
+            <a:fillRect/>
+          </a:stretch>
+        </p:blipFill>
+        <p:spPr bwMode="auto">
+          <a:xfrm>
+            <a:off x="7247812" y="2617237"/>
+            <a:ext cx="4445000" cy="3333750"/>
+          </a:xfrm>
+          <a:prstGeom prst="rect">
+            <a:avLst/>
+          </a:prstGeom>
+          <a:noFill/>
+          <a:ln w="9525">
+            <a:solidFill>
+              <a:srgbClr val="000000"/>
+            </a:solidFill>
+            <a:miter lim="800000"/>
+            <a:headEnd/>
+            <a:tailEnd/>
+          </a:ln>
+          <a:extLst>
+            <a:ext uri="{909E8E84-426E-40DD-AFC4-6F175D3DCCD1}">
+              <a14:hiddenFill xmlns:a14="http://schemas.microsoft.com/office/drawing/2010/main">
+                <a:solidFill>
+                  <a:srgbClr val="FFFFFF"/>
+                </a:solidFill>
+              </a14:hiddenFill>
+            </a:ext>
+          </a:extLst>
+        </p:spPr>
+      </p:pic>
+      <p:pic>
+        <p:nvPicPr>
+          <p:cNvPr id="5" name="Bildobjekt 1"/>
+          <p:cNvPicPr>
+            <a:picLocks/>
+          </p:cNvPicPr>
+          <p:nvPr/>
+        </p:nvPicPr>
+        <p:blipFill>
+          <a:blip r:embed="rId3">
+            <a:extLst>
+              <a:ext uri="{28A0092B-C50C-407E-A947-70E740481C1C}">
+                <a14:useLocalDpi xmlns:a14="http://schemas.microsoft.com/office/drawing/2010/main" val="0"/>
+              </a:ext>
+            </a:extLst>
+          </a:blip>
+          <a:srcRect/>
+          <a:stretch>
+            <a:fillRect/>
+          </a:stretch>
+        </p:blipFill>
+        <p:spPr bwMode="auto">
+          <a:xfrm>
+            <a:off x="3995024" y="1636466"/>
+            <a:ext cx="4445000" cy="3333750"/>
+          </a:xfrm>
+          <a:prstGeom prst="rect">
+            <a:avLst/>
+          </a:prstGeom>
+          <a:noFill/>
+          <a:ln w="9525">
+            <a:solidFill>
+              <a:srgbClr val="000000"/>
+            </a:solidFill>
+            <a:miter lim="800000"/>
+            <a:headEnd/>
+            <a:tailEnd/>
+          </a:ln>
+          <a:extLst>
+            <a:ext uri="{909E8E84-426E-40DD-AFC4-6F175D3DCCD1}">
+              <a14:hiddenFill xmlns:a14="http://schemas.microsoft.com/office/drawing/2010/main">
+                <a:solidFill>
+                  <a:srgbClr val="FFFFFF"/>
+                </a:solidFill>
+              </a14:hiddenFill>
+            </a:ext>
+          </a:extLst>
+        </p:spPr>
+      </p:pic>
+      <p:pic>
+        <p:nvPicPr>
+          <p:cNvPr id="6" name="Bildobjekt 1"/>
+          <p:cNvPicPr>
+            <a:picLocks/>
+          </p:cNvPicPr>
+          <p:nvPr/>
+        </p:nvPicPr>
+        <p:blipFill>
+          <a:blip r:embed="rId4">
+            <a:extLst>
+              <a:ext uri="{28A0092B-C50C-407E-A947-70E740481C1C}">
+                <a14:useLocalDpi xmlns:a14="http://schemas.microsoft.com/office/drawing/2010/main" val="0"/>
+              </a:ext>
+            </a:extLst>
+          </a:blip>
+          <a:srcRect/>
+          <a:stretch>
+            <a:fillRect/>
+          </a:stretch>
+        </p:blipFill>
+        <p:spPr bwMode="auto">
+          <a:xfrm>
+            <a:off x="412924" y="3164747"/>
+            <a:ext cx="4445000" cy="3333750"/>
+          </a:xfrm>
+          <a:prstGeom prst="rect">
+            <a:avLst/>
+          </a:prstGeom>
+          <a:noFill/>
+          <a:ln w="9525">
+            <a:solidFill>
+              <a:srgbClr val="000000"/>
+            </a:solidFill>
+            <a:miter lim="800000"/>
+            <a:headEnd/>
+            <a:tailEnd/>
+          </a:ln>
+          <a:extLst>
+            <a:ext uri="{909E8E84-426E-40DD-AFC4-6F175D3DCCD1}">
+              <a14:hiddenFill xmlns:a14="http://schemas.microsoft.com/office/drawing/2010/main">
+                <a:solidFill>
+                  <a:srgbClr val="FFFFFF"/>
+                </a:solidFill>
+              </a14:hiddenFill>
+            </a:ext>
+          </a:extLst>
+        </p:spPr>
+      </p:pic>
+    </p:spTree>
+    <p:extLst>
+      <p:ext uri="{BB962C8B-B14F-4D97-AF65-F5344CB8AC3E}">
+        <p14:creationId xmlns:p14="http://schemas.microsoft.com/office/powerpoint/2010/main" val="3021860077"/>
       </p:ext>
     </p:extLst>
   </p:cSld>

</xml_diff>

<commit_message>
All images ready for presentation
</commit_message>
<xml_diff>
--- a/Projekt/Presentation.pptx
+++ b/Projekt/Presentation.pptx
@@ -9,6 +9,8 @@
     <p:sldId id="257" r:id="rId3"/>
     <p:sldId id="258" r:id="rId4"/>
     <p:sldId id="259" r:id="rId5"/>
+    <p:sldId id="260" r:id="rId6"/>
+    <p:sldId id="261" r:id="rId7"/>
   </p:sldIdLst>
   <p:sldSz cx="12192000" cy="6858000"/>
   <p:notesSz cx="6858000" cy="9144000"/>
@@ -3038,170 +3040,25 @@
           </a:p>
         </p:txBody>
       </p:sp>
-      <p:pic>
-        <p:nvPicPr>
-          <p:cNvPr id="7" name="Bildobjekt 1"/>
-          <p:cNvPicPr>
-            <a:picLocks/>
-          </p:cNvPicPr>
-          <p:nvPr/>
-        </p:nvPicPr>
-        <p:blipFill>
-          <a:blip r:embed="rId2">
-            <a:extLst>
-              <a:ext uri="{28A0092B-C50C-407E-A947-70E740481C1C}">
-                <a14:useLocalDpi xmlns:a14="http://schemas.microsoft.com/office/drawing/2010/main" val="0"/>
-              </a:ext>
-            </a:extLst>
-          </a:blip>
-          <a:srcRect/>
-          <a:stretch>
-            <a:fillRect/>
-          </a:stretch>
-        </p:blipFill>
-        <p:spPr bwMode="auto">
-          <a:xfrm>
-            <a:off x="7856375" y="2509935"/>
-            <a:ext cx="4256832" cy="3111581"/>
-          </a:xfrm>
-          <a:prstGeom prst="rect">
-            <a:avLst/>
-          </a:prstGeom>
-          <a:noFill/>
-          <a:ln>
-            <a:noFill/>
-          </a:ln>
-          <a:extLst>
-            <a:ext uri="{909E8E84-426E-40DD-AFC4-6F175D3DCCD1}">
-              <a14:hiddenFill xmlns:a14="http://schemas.microsoft.com/office/drawing/2010/main">
-                <a:solidFill>
-                  <a:srgbClr val="FFFFFF"/>
-                </a:solidFill>
-              </a14:hiddenFill>
-            </a:ext>
-            <a:ext uri="{91240B29-F687-4F45-9708-019B960494DF}">
-              <a14:hiddenLine xmlns:a14="http://schemas.microsoft.com/office/drawing/2010/main" w="9525">
-                <a:solidFill>
-                  <a:srgbClr val="000000"/>
-                </a:solidFill>
-                <a:miter lim="800000"/>
-                <a:headEnd/>
-                <a:tailEnd/>
-              </a14:hiddenLine>
-            </a:ext>
-          </a:extLst>
-        </p:spPr>
-      </p:pic>
-      <p:pic>
-        <p:nvPicPr>
-          <p:cNvPr id="10" name="Bildobjekt 1"/>
-          <p:cNvPicPr>
-            <a:picLocks/>
-          </p:cNvPicPr>
-          <p:nvPr/>
-        </p:nvPicPr>
-        <p:blipFill>
-          <a:blip r:embed="rId3">
-            <a:extLst>
-              <a:ext uri="{28A0092B-C50C-407E-A947-70E740481C1C}">
-                <a14:useLocalDpi xmlns:a14="http://schemas.microsoft.com/office/drawing/2010/main" val="0"/>
-              </a:ext>
-            </a:extLst>
-          </a:blip>
-          <a:srcRect/>
-          <a:stretch>
-            <a:fillRect/>
-          </a:stretch>
-        </p:blipFill>
-        <p:spPr bwMode="auto">
-          <a:xfrm>
-            <a:off x="4231509" y="2509935"/>
-            <a:ext cx="3864947" cy="3046267"/>
-          </a:xfrm>
-          <a:prstGeom prst="rect">
-            <a:avLst/>
-          </a:prstGeom>
-          <a:noFill/>
-          <a:ln>
-            <a:noFill/>
-          </a:ln>
-          <a:extLst>
-            <a:ext uri="{909E8E84-426E-40DD-AFC4-6F175D3DCCD1}">
-              <a14:hiddenFill xmlns:a14="http://schemas.microsoft.com/office/drawing/2010/main">
-                <a:solidFill>
-                  <a:srgbClr val="FFFFFF"/>
-                </a:solidFill>
-              </a14:hiddenFill>
-            </a:ext>
-            <a:ext uri="{91240B29-F687-4F45-9708-019B960494DF}">
-              <a14:hiddenLine xmlns:a14="http://schemas.microsoft.com/office/drawing/2010/main" w="9525">
-                <a:solidFill>
-                  <a:srgbClr val="000000"/>
-                </a:solidFill>
-                <a:miter lim="800000"/>
-                <a:headEnd/>
-                <a:tailEnd/>
-              </a14:hiddenLine>
-            </a:ext>
-          </a:extLst>
-        </p:spPr>
-      </p:pic>
-      <p:pic>
-        <p:nvPicPr>
-          <p:cNvPr id="14" name="Bildobjekt 1"/>
-          <p:cNvPicPr>
-            <a:picLocks noGrp="1"/>
-          </p:cNvPicPr>
+      <p:sp>
+        <p:nvSpPr>
+          <p:cNvPr id="4" name="Platshållare för innehåll 3"/>
+          <p:cNvSpPr>
+            <a:spLocks noGrp="1"/>
+          </p:cNvSpPr>
           <p:nvPr>
             <p:ph idx="1"/>
           </p:nvPr>
-        </p:nvPicPr>
-        <p:blipFill>
-          <a:blip r:embed="rId4">
-            <a:extLst>
-              <a:ext uri="{28A0092B-C50C-407E-A947-70E740481C1C}">
-                <a14:useLocalDpi xmlns:a14="http://schemas.microsoft.com/office/drawing/2010/main" val="0"/>
-              </a:ext>
-            </a:extLst>
-          </a:blip>
-          <a:srcRect/>
-          <a:stretch>
-            <a:fillRect/>
-          </a:stretch>
-        </p:blipFill>
-        <p:spPr bwMode="auto">
-          <a:xfrm>
-            <a:off x="234970" y="2287765"/>
-            <a:ext cx="4588958" cy="3666875"/>
-          </a:xfrm>
-          <a:prstGeom prst="rect">
-            <a:avLst/>
-          </a:prstGeom>
-          <a:noFill/>
-          <a:ln>
-            <a:noFill/>
-          </a:ln>
-          <a:extLst>
-            <a:ext uri="{909E8E84-426E-40DD-AFC4-6F175D3DCCD1}">
-              <a14:hiddenFill xmlns:a14="http://schemas.microsoft.com/office/drawing/2010/main">
-                <a:solidFill>
-                  <a:srgbClr val="FFFFFF"/>
-                </a:solidFill>
-              </a14:hiddenFill>
-            </a:ext>
-            <a:ext uri="{91240B29-F687-4F45-9708-019B960494DF}">
-              <a14:hiddenLine xmlns:a14="http://schemas.microsoft.com/office/drawing/2010/main" w="9525">
-                <a:solidFill>
-                  <a:srgbClr val="000000"/>
-                </a:solidFill>
-                <a:miter lim="800000"/>
-                <a:headEnd/>
-                <a:tailEnd/>
-              </a14:hiddenLine>
-            </a:ext>
-          </a:extLst>
-        </p:spPr>
-      </p:pic>
+        </p:nvSpPr>
+        <p:spPr/>
+        <p:txBody>
+          <a:bodyPr/>
+          <a:lstStyle/>
+          <a:p>
+            <a:endParaRPr lang="sv-SE" dirty="0"/>
+          </a:p>
+        </p:txBody>
+      </p:sp>
     </p:spTree>
     <p:extLst>
       <p:ext uri="{BB962C8B-B14F-4D97-AF65-F5344CB8AC3E}">
@@ -3519,7 +3376,7 @@
         </p:blipFill>
         <p:spPr bwMode="auto">
           <a:xfrm>
-            <a:off x="7247812" y="2617237"/>
+            <a:off x="7221308" y="2232924"/>
             <a:ext cx="4445000" cy="3333750"/>
           </a:xfrm>
           <a:prstGeom prst="rect">
@@ -3568,7 +3425,7 @@
         </p:blipFill>
         <p:spPr bwMode="auto">
           <a:xfrm>
-            <a:off x="3995024" y="1636466"/>
+            <a:off x="3873500" y="1901130"/>
             <a:ext cx="4445000" cy="3333750"/>
           </a:xfrm>
           <a:prstGeom prst="rect">
@@ -3617,7 +3474,56 @@
         </p:blipFill>
         <p:spPr bwMode="auto">
           <a:xfrm>
-            <a:off x="412924" y="3164747"/>
+            <a:off x="231764" y="1334675"/>
+            <a:ext cx="4445000" cy="3333750"/>
+          </a:xfrm>
+          <a:prstGeom prst="rect">
+            <a:avLst/>
+          </a:prstGeom>
+          <a:noFill/>
+          <a:ln w="9525">
+            <a:solidFill>
+              <a:srgbClr val="000000"/>
+            </a:solidFill>
+            <a:miter lim="800000"/>
+            <a:headEnd/>
+            <a:tailEnd/>
+          </a:ln>
+          <a:extLst>
+            <a:ext uri="{909E8E84-426E-40DD-AFC4-6F175D3DCCD1}">
+              <a14:hiddenFill xmlns:a14="http://schemas.microsoft.com/office/drawing/2010/main">
+                <a:solidFill>
+                  <a:srgbClr val="FFFFFF"/>
+                </a:solidFill>
+              </a14:hiddenFill>
+            </a:ext>
+          </a:extLst>
+        </p:spPr>
+      </p:pic>
+      <p:pic>
+        <p:nvPicPr>
+          <p:cNvPr id="8" name="Bildobjekt 1"/>
+          <p:cNvPicPr>
+            <a:picLocks/>
+          </p:cNvPicPr>
+          <p:nvPr/>
+        </p:nvPicPr>
+        <p:blipFill>
+          <a:blip r:embed="rId5">
+            <a:extLst>
+              <a:ext uri="{28A0092B-C50C-407E-A947-70E740481C1C}">
+                <a14:useLocalDpi xmlns:a14="http://schemas.microsoft.com/office/drawing/2010/main" val="0"/>
+              </a:ext>
+            </a:extLst>
+          </a:blip>
+          <a:srcRect/>
+          <a:stretch>
+            <a:fillRect/>
+          </a:stretch>
+        </p:blipFill>
+        <p:spPr bwMode="auto">
+          <a:xfrm>
+            <a:off x="3229412" y="3543786"/>
             <a:ext cx="4445000" cy="3333750"/>
           </a:xfrm>
           <a:prstGeom prst="rect">
@@ -3647,6 +3553,180 @@
     <p:extLst>
       <p:ext uri="{BB962C8B-B14F-4D97-AF65-F5344CB8AC3E}">
         <p14:creationId xmlns:p14="http://schemas.microsoft.com/office/powerpoint/2010/main" val="3021860077"/>
+      </p:ext>
+    </p:extLst>
+  </p:cSld>
+  <p:clrMapOvr>
+    <a:masterClrMapping/>
+  </p:clrMapOvr>
+</p:sld>
+</file>
+
+<file path=ppt/slides/slide5.xml><?xml version="1.0" encoding="utf-8"?>
+<p:sld xmlns:a="http://schemas.openxmlformats.org/drawingml/2006/main" xmlns:r="http://schemas.openxmlformats.org/officeDocument/2006/relationships" xmlns:p="http://schemas.openxmlformats.org/presentationml/2006/main">
+  <p:cSld>
+    <p:spTree>
+      <p:nvGrpSpPr>
+        <p:cNvPr id="1" name=""/>
+        <p:cNvGrpSpPr/>
+        <p:nvPr/>
+      </p:nvGrpSpPr>
+      <p:grpSpPr>
+        <a:xfrm>
+          <a:off x="0" y="0"/>
+          <a:ext cx="0" cy="0"/>
+          <a:chOff x="0" y="0"/>
+          <a:chExt cx="0" cy="0"/>
+        </a:xfrm>
+      </p:grpSpPr>
+      <p:sp>
+        <p:nvSpPr>
+          <p:cNvPr id="2" name="Rubrik 1"/>
+          <p:cNvSpPr>
+            <a:spLocks noGrp="1"/>
+          </p:cNvSpPr>
+          <p:nvPr>
+            <p:ph type="title"/>
+          </p:nvPr>
+        </p:nvSpPr>
+        <p:spPr/>
+        <p:txBody>
+          <a:bodyPr/>
+          <a:lstStyle/>
+          <a:p>
+            <a:endParaRPr lang="sv-SE"/>
+          </a:p>
+        </p:txBody>
+      </p:sp>
+      <p:pic>
+        <p:nvPicPr>
+          <p:cNvPr id="6" name="Bildobjekt 1"/>
+          <p:cNvPicPr>
+            <a:picLocks/>
+          </p:cNvPicPr>
+          <p:nvPr/>
+        </p:nvPicPr>
+        <p:blipFill>
+          <a:blip r:embed="rId2">
+            <a:extLst>
+              <a:ext uri="{28A0092B-C50C-407E-A947-70E740481C1C}">
+                <a14:useLocalDpi xmlns:a14="http://schemas.microsoft.com/office/drawing/2010/main" val="0"/>
+              </a:ext>
+            </a:extLst>
+          </a:blip>
+          <a:srcRect/>
+          <a:stretch>
+            <a:fillRect/>
+          </a:stretch>
+        </p:blipFill>
+        <p:spPr bwMode="auto">
+          <a:xfrm>
+            <a:off x="6908800" y="2598293"/>
+            <a:ext cx="4445000" cy="3333750"/>
+          </a:xfrm>
+          <a:prstGeom prst="rect">
+            <a:avLst/>
+          </a:prstGeom>
+          <a:noFill/>
+          <a:ln w="9525">
+            <a:solidFill>
+              <a:srgbClr val="000000"/>
+            </a:solidFill>
+            <a:miter lim="800000"/>
+            <a:headEnd/>
+            <a:tailEnd/>
+          </a:ln>
+          <a:extLst>
+            <a:ext uri="{909E8E84-426E-40DD-AFC4-6F175D3DCCD1}">
+              <a14:hiddenFill xmlns:a14="http://schemas.microsoft.com/office/drawing/2010/main">
+                <a:solidFill>
+                  <a:srgbClr val="FFFFFF"/>
+                </a:solidFill>
+              </a14:hiddenFill>
+            </a:ext>
+          </a:extLst>
+        </p:spPr>
+      </p:pic>
+    </p:spTree>
+    <p:extLst>
+      <p:ext uri="{BB962C8B-B14F-4D97-AF65-F5344CB8AC3E}">
+        <p14:creationId xmlns:p14="http://schemas.microsoft.com/office/powerpoint/2010/main" val="3509347792"/>
+      </p:ext>
+    </p:extLst>
+  </p:cSld>
+  <p:clrMapOvr>
+    <a:masterClrMapping/>
+  </p:clrMapOvr>
+</p:sld>
+</file>
+
+<file path=ppt/slides/slide6.xml><?xml version="1.0" encoding="utf-8"?>
+<p:sld xmlns:a="http://schemas.openxmlformats.org/drawingml/2006/main" xmlns:r="http://schemas.openxmlformats.org/officeDocument/2006/relationships" xmlns:p="http://schemas.openxmlformats.org/presentationml/2006/main">
+  <p:cSld>
+    <p:spTree>
+      <p:nvGrpSpPr>
+        <p:cNvPr id="1" name=""/>
+        <p:cNvGrpSpPr/>
+        <p:nvPr/>
+      </p:nvGrpSpPr>
+      <p:grpSpPr>
+        <a:xfrm>
+          <a:off x="0" y="0"/>
+          <a:ext cx="0" cy="0"/>
+          <a:chOff x="0" y="0"/>
+          <a:chExt cx="0" cy="0"/>
+        </a:xfrm>
+      </p:grpSpPr>
+      <p:sp>
+        <p:nvSpPr>
+          <p:cNvPr id="2" name="Rubrik 1"/>
+          <p:cNvSpPr>
+            <a:spLocks noGrp="1"/>
+          </p:cNvSpPr>
+          <p:nvPr>
+            <p:ph type="title"/>
+          </p:nvPr>
+        </p:nvSpPr>
+        <p:spPr/>
+        <p:txBody>
+          <a:bodyPr/>
+          <a:lstStyle/>
+          <a:p>
+            <a:endParaRPr lang="sv-SE"/>
+          </a:p>
+        </p:txBody>
+      </p:sp>
+      <p:sp>
+        <p:nvSpPr>
+          <p:cNvPr id="3" name="Platshållare för innehåll 2"/>
+          <p:cNvSpPr>
+            <a:spLocks noGrp="1"/>
+          </p:cNvSpPr>
+          <p:nvPr>
+            <p:ph idx="1"/>
+          </p:nvPr>
+        </p:nvSpPr>
+        <p:spPr/>
+        <p:txBody>
+          <a:bodyPr/>
+          <a:lstStyle/>
+          <a:p>
+            <a:r>
+              <a:rPr lang="sv-SE" dirty="0"/>
+              <a:t>Beräkning av felet genom att jämföra med beräkningar från mycket små steglängder i ode45 ger att steglängd 0.1 medför 5 korrekta decimaler. Svar: </a:t>
+            </a:r>
+            <a:r>
+              <a:rPr lang="sv-SE" dirty="0"/>
+              <a:t>32.96043 m</a:t>
+            </a:r>
+            <a:endParaRPr lang="sv-SE" dirty="0"/>
+          </a:p>
+        </p:txBody>
+      </p:sp>
+    </p:spTree>
+    <p:extLst>
+      <p:ext uri="{BB962C8B-B14F-4D97-AF65-F5344CB8AC3E}">
+        <p14:creationId xmlns:p14="http://schemas.microsoft.com/office/powerpoint/2010/main" val="1137993206"/>
       </p:ext>
     </p:extLst>
   </p:cSld>

</xml_diff>